<commit_message>
Added Azure LogProbs Example
</commit_message>
<xml_diff>
--- a/AzureOpenAILogProbs/Images/AzureOpenAILogProbs.pptx
+++ b/AzureOpenAILogProbs/Images/AzureOpenAILogProbs.pptx
@@ -6,6 +6,7 @@
   </p:sldMasterIdLst>
   <p:sldIdLst>
     <p:sldId id="256" r:id="rId2"/>
+    <p:sldId id="257" r:id="rId3"/>
   </p:sldIdLst>
   <p:sldSz cx="12192000" cy="6858000"/>
   <p:notesSz cx="6858000" cy="9144000"/>
@@ -104,6 +105,11 @@
       </a:defRPr>
     </a:lvl9pPr>
   </p:defaultTextStyle>
+  <p:extLst>
+    <p:ext uri="{EFAFB233-063F-42B5-8137-9DF3F51BA10A}">
+      <p15:sldGuideLst xmlns:p15="http://schemas.microsoft.com/office/powerpoint/2012/main"/>
+    </p:ext>
+  </p:extLst>
 </p:presentation>
 </file>
 
@@ -254,7 +260,7 @@
           <a:p>
             <a:fld id="{BA901681-57B6-4587-B25D-B43F61E622D1}" type="datetimeFigureOut">
               <a:rPr lang="en-US" smtClean="0"/>
-              <a:t>3/31/2024</a:t>
+              <a:t>4/2/2024</a:t>
             </a:fld>
             <a:endParaRPr lang="en-US" dirty="0"/>
           </a:p>
@@ -452,7 +458,7 @@
           <a:p>
             <a:fld id="{BA901681-57B6-4587-B25D-B43F61E622D1}" type="datetimeFigureOut">
               <a:rPr lang="en-US" smtClean="0"/>
-              <a:t>3/31/2024</a:t>
+              <a:t>4/2/2024</a:t>
             </a:fld>
             <a:endParaRPr lang="en-US" dirty="0"/>
           </a:p>
@@ -660,7 +666,7 @@
           <a:p>
             <a:fld id="{BA901681-57B6-4587-B25D-B43F61E622D1}" type="datetimeFigureOut">
               <a:rPr lang="en-US" smtClean="0"/>
-              <a:t>3/31/2024</a:t>
+              <a:t>4/2/2024</a:t>
             </a:fld>
             <a:endParaRPr lang="en-US" dirty="0"/>
           </a:p>
@@ -858,7 +864,7 @@
           <a:p>
             <a:fld id="{BA901681-57B6-4587-B25D-B43F61E622D1}" type="datetimeFigureOut">
               <a:rPr lang="en-US" smtClean="0"/>
-              <a:t>3/31/2024</a:t>
+              <a:t>4/2/2024</a:t>
             </a:fld>
             <a:endParaRPr lang="en-US" dirty="0"/>
           </a:p>
@@ -1133,7 +1139,7 @@
           <a:p>
             <a:fld id="{BA901681-57B6-4587-B25D-B43F61E622D1}" type="datetimeFigureOut">
               <a:rPr lang="en-US" smtClean="0"/>
-              <a:t>3/31/2024</a:t>
+              <a:t>4/2/2024</a:t>
             </a:fld>
             <a:endParaRPr lang="en-US" dirty="0"/>
           </a:p>
@@ -1398,7 +1404,7 @@
           <a:p>
             <a:fld id="{BA901681-57B6-4587-B25D-B43F61E622D1}" type="datetimeFigureOut">
               <a:rPr lang="en-US" smtClean="0"/>
-              <a:t>3/31/2024</a:t>
+              <a:t>4/2/2024</a:t>
             </a:fld>
             <a:endParaRPr lang="en-US" dirty="0"/>
           </a:p>
@@ -1810,7 +1816,7 @@
           <a:p>
             <a:fld id="{BA901681-57B6-4587-B25D-B43F61E622D1}" type="datetimeFigureOut">
               <a:rPr lang="en-US" smtClean="0"/>
-              <a:t>3/31/2024</a:t>
+              <a:t>4/2/2024</a:t>
             </a:fld>
             <a:endParaRPr lang="en-US" dirty="0"/>
           </a:p>
@@ -1951,7 +1957,7 @@
           <a:p>
             <a:fld id="{BA901681-57B6-4587-B25D-B43F61E622D1}" type="datetimeFigureOut">
               <a:rPr lang="en-US" smtClean="0"/>
-              <a:t>3/31/2024</a:t>
+              <a:t>4/2/2024</a:t>
             </a:fld>
             <a:endParaRPr lang="en-US" dirty="0"/>
           </a:p>
@@ -2064,7 +2070,7 @@
           <a:p>
             <a:fld id="{BA901681-57B6-4587-B25D-B43F61E622D1}" type="datetimeFigureOut">
               <a:rPr lang="en-US" smtClean="0"/>
-              <a:t>3/31/2024</a:t>
+              <a:t>4/2/2024</a:t>
             </a:fld>
             <a:endParaRPr lang="en-US" dirty="0"/>
           </a:p>
@@ -2375,7 +2381,7 @@
           <a:p>
             <a:fld id="{BA901681-57B6-4587-B25D-B43F61E622D1}" type="datetimeFigureOut">
               <a:rPr lang="en-US" smtClean="0"/>
-              <a:t>3/31/2024</a:t>
+              <a:t>4/2/2024</a:t>
             </a:fld>
             <a:endParaRPr lang="en-US" dirty="0"/>
           </a:p>
@@ -2663,7 +2669,7 @@
           <a:p>
             <a:fld id="{BA901681-57B6-4587-B25D-B43F61E622D1}" type="datetimeFigureOut">
               <a:rPr lang="en-US" smtClean="0"/>
-              <a:t>3/31/2024</a:t>
+              <a:t>4/2/2024</a:t>
             </a:fld>
             <a:endParaRPr lang="en-US" dirty="0"/>
           </a:p>
@@ -2904,7 +2910,7 @@
           <a:p>
             <a:fld id="{BA901681-57B6-4587-B25D-B43F61E622D1}" type="datetimeFigureOut">
               <a:rPr lang="en-US" smtClean="0"/>
-              <a:t>3/31/2024</a:t>
+              <a:t>4/2/2024</a:t>
             </a:fld>
             <a:endParaRPr lang="en-US" dirty="0"/>
           </a:p>
@@ -4687,6 +4693,210 @@
 </p:sld>
 </file>
 
+<file path=ppt/slides/slide2.xml><?xml version="1.0" encoding="utf-8"?>
+<p:sld xmlns:a="http://schemas.openxmlformats.org/drawingml/2006/main" xmlns:r="http://schemas.openxmlformats.org/officeDocument/2006/relationships" xmlns:p="http://schemas.openxmlformats.org/presentationml/2006/main">
+  <p:cSld>
+    <p:spTree>
+      <p:nvGrpSpPr>
+        <p:cNvPr id="1" name=""/>
+        <p:cNvGrpSpPr/>
+        <p:nvPr/>
+      </p:nvGrpSpPr>
+      <p:grpSpPr>
+        <a:xfrm>
+          <a:off x="0" y="0"/>
+          <a:ext cx="0" cy="0"/>
+          <a:chOff x="0" y="0"/>
+          <a:chExt cx="0" cy="0"/>
+        </a:xfrm>
+      </p:grpSpPr>
+      <p:pic>
+        <p:nvPicPr>
+          <p:cNvPr id="5" name="Picture 4">
+            <a:extLst>
+              <a:ext uri="{FF2B5EF4-FFF2-40B4-BE49-F238E27FC236}">
+                <a16:creationId xmlns:a16="http://schemas.microsoft.com/office/drawing/2014/main" id="{660BD6FC-3E7A-C78B-2C82-1206EBB03DC9}"/>
+              </a:ext>
+            </a:extLst>
+          </p:cNvPr>
+          <p:cNvPicPr>
+            <a:picLocks noChangeAspect="1"/>
+          </p:cNvPicPr>
+          <p:nvPr/>
+        </p:nvPicPr>
+        <p:blipFill>
+          <a:blip r:embed="rId2"/>
+          <a:stretch>
+            <a:fillRect/>
+          </a:stretch>
+        </p:blipFill>
+        <p:spPr>
+          <a:xfrm>
+            <a:off x="2894685" y="1064543"/>
+            <a:ext cx="6402629" cy="1034991"/>
+          </a:xfrm>
+          <a:prstGeom prst="rect">
+            <a:avLst/>
+          </a:prstGeom>
+        </p:spPr>
+      </p:pic>
+      <p:pic>
+        <p:nvPicPr>
+          <p:cNvPr id="7" name="Picture 6">
+            <a:extLst>
+              <a:ext uri="{FF2B5EF4-FFF2-40B4-BE49-F238E27FC236}">
+                <a16:creationId xmlns:a16="http://schemas.microsoft.com/office/drawing/2014/main" id="{659CEB1B-4767-A71A-9D2C-9B88A7D5EBDB}"/>
+              </a:ext>
+            </a:extLst>
+          </p:cNvPr>
+          <p:cNvPicPr>
+            <a:picLocks noChangeAspect="1"/>
+          </p:cNvPicPr>
+          <p:nvPr/>
+        </p:nvPicPr>
+        <p:blipFill>
+          <a:blip r:embed="rId3"/>
+          <a:stretch>
+            <a:fillRect/>
+          </a:stretch>
+        </p:blipFill>
+        <p:spPr>
+          <a:xfrm>
+            <a:off x="1558104" y="2354136"/>
+            <a:ext cx="2083783" cy="2361839"/>
+          </a:xfrm>
+          <a:prstGeom prst="rect">
+            <a:avLst/>
+          </a:prstGeom>
+        </p:spPr>
+      </p:pic>
+      <p:pic>
+        <p:nvPicPr>
+          <p:cNvPr id="9" name="Picture 8">
+            <a:extLst>
+              <a:ext uri="{FF2B5EF4-FFF2-40B4-BE49-F238E27FC236}">
+                <a16:creationId xmlns:a16="http://schemas.microsoft.com/office/drawing/2014/main" id="{D638B0DC-4977-7F38-7335-045F48D7E79F}"/>
+              </a:ext>
+            </a:extLst>
+          </p:cNvPr>
+          <p:cNvPicPr>
+            <a:picLocks noChangeAspect="1"/>
+          </p:cNvPicPr>
+          <p:nvPr/>
+        </p:nvPicPr>
+        <p:blipFill>
+          <a:blip r:embed="rId4"/>
+          <a:stretch>
+            <a:fillRect/>
+          </a:stretch>
+        </p:blipFill>
+        <p:spPr>
+          <a:xfrm>
+            <a:off x="4035464" y="2354135"/>
+            <a:ext cx="2060535" cy="2361840"/>
+          </a:xfrm>
+          <a:prstGeom prst="rect">
+            <a:avLst/>
+          </a:prstGeom>
+        </p:spPr>
+      </p:pic>
+      <p:cxnSp>
+        <p:nvCxnSpPr>
+          <p:cNvPr id="11" name="Connector: Curved 10">
+            <a:extLst>
+              <a:ext uri="{FF2B5EF4-FFF2-40B4-BE49-F238E27FC236}">
+                <a16:creationId xmlns:a16="http://schemas.microsoft.com/office/drawing/2014/main" id="{85F51AF2-E50A-471B-8208-09A2DF91C312}"/>
+              </a:ext>
+            </a:extLst>
+          </p:cNvPr>
+          <p:cNvCxnSpPr>
+            <a:cxnSpLocks/>
+            <a:endCxn id="7" idx="0"/>
+          </p:cNvCxnSpPr>
+          <p:nvPr/>
+        </p:nvCxnSpPr>
+        <p:spPr>
+          <a:xfrm rot="10800000" flipV="1">
+            <a:off x="2599996" y="1941474"/>
+            <a:ext cx="806252" cy="412661"/>
+          </a:xfrm>
+          <a:prstGeom prst="curvedConnector2">
+            <a:avLst/>
+          </a:prstGeom>
+          <a:ln>
+            <a:tailEnd type="triangle"/>
+          </a:ln>
+        </p:spPr>
+        <p:style>
+          <a:lnRef idx="1">
+            <a:schemeClr val="accent1"/>
+          </a:lnRef>
+          <a:fillRef idx="0">
+            <a:schemeClr val="accent1"/>
+          </a:fillRef>
+          <a:effectRef idx="0">
+            <a:schemeClr val="accent1"/>
+          </a:effectRef>
+          <a:fontRef idx="minor">
+            <a:schemeClr val="tx1"/>
+          </a:fontRef>
+        </p:style>
+      </p:cxnSp>
+      <p:cxnSp>
+        <p:nvCxnSpPr>
+          <p:cNvPr id="14" name="Connector: Curved 13">
+            <a:extLst>
+              <a:ext uri="{FF2B5EF4-FFF2-40B4-BE49-F238E27FC236}">
+                <a16:creationId xmlns:a16="http://schemas.microsoft.com/office/drawing/2014/main" id="{DC708C17-0193-9C06-1FE3-27716E26D95C}"/>
+              </a:ext>
+            </a:extLst>
+          </p:cNvPr>
+          <p:cNvCxnSpPr>
+            <a:cxnSpLocks/>
+            <a:endCxn id="9" idx="0"/>
+          </p:cNvCxnSpPr>
+          <p:nvPr/>
+        </p:nvCxnSpPr>
+        <p:spPr>
+          <a:xfrm>
+            <a:off x="3956622" y="1941474"/>
+            <a:ext cx="1109110" cy="412661"/>
+          </a:xfrm>
+          <a:prstGeom prst="curvedConnector2">
+            <a:avLst/>
+          </a:prstGeom>
+          <a:ln>
+            <a:tailEnd type="triangle"/>
+          </a:ln>
+        </p:spPr>
+        <p:style>
+          <a:lnRef idx="1">
+            <a:schemeClr val="accent1"/>
+          </a:lnRef>
+          <a:fillRef idx="0">
+            <a:schemeClr val="accent1"/>
+          </a:fillRef>
+          <a:effectRef idx="0">
+            <a:schemeClr val="accent1"/>
+          </a:effectRef>
+          <a:fontRef idx="minor">
+            <a:schemeClr val="tx1"/>
+          </a:fontRef>
+        </p:style>
+      </p:cxnSp>
+    </p:spTree>
+    <p:extLst>
+      <p:ext uri="{BB962C8B-B14F-4D97-AF65-F5344CB8AC3E}">
+        <p14:creationId xmlns:p14="http://schemas.microsoft.com/office/powerpoint/2010/main" val="2577095350"/>
+      </p:ext>
+    </p:extLst>
+  </p:cSld>
+  <p:clrMapOvr>
+    <a:masterClrMapping/>
+  </p:clrMapOvr>
+</p:sld>
+</file>
+
 <file path=ppt/theme/theme1.xml><?xml version="1.0" encoding="utf-8"?>
 <a:theme xmlns:a="http://schemas.openxmlformats.org/drawingml/2006/main" name="Office Theme">
   <a:themeElements>

</xml_diff>

<commit_message>
Added Azure LogProbs Images
</commit_message>
<xml_diff>
--- a/AzureOpenAILogProbs/Images/AzureOpenAILogProbs.pptx
+++ b/AzureOpenAILogProbs/Images/AzureOpenAILogProbs.pptx
@@ -7,6 +7,7 @@
   <p:sldIdLst>
     <p:sldId id="256" r:id="rId2"/>
     <p:sldId id="257" r:id="rId3"/>
+    <p:sldId id="261" r:id="rId4"/>
   </p:sldIdLst>
   <p:sldSz cx="12192000" cy="6858000"/>
   <p:notesSz cx="6858000" cy="9144000"/>
@@ -260,7 +261,7 @@
           <a:p>
             <a:fld id="{BA901681-57B6-4587-B25D-B43F61E622D1}" type="datetimeFigureOut">
               <a:rPr lang="en-US" smtClean="0"/>
-              <a:t>4/2/2024</a:t>
+              <a:t>4/5/2024</a:t>
             </a:fld>
             <a:endParaRPr lang="en-US" dirty="0"/>
           </a:p>
@@ -458,7 +459,7 @@
           <a:p>
             <a:fld id="{BA901681-57B6-4587-B25D-B43F61E622D1}" type="datetimeFigureOut">
               <a:rPr lang="en-US" smtClean="0"/>
-              <a:t>4/2/2024</a:t>
+              <a:t>4/5/2024</a:t>
             </a:fld>
             <a:endParaRPr lang="en-US" dirty="0"/>
           </a:p>
@@ -666,7 +667,7 @@
           <a:p>
             <a:fld id="{BA901681-57B6-4587-B25D-B43F61E622D1}" type="datetimeFigureOut">
               <a:rPr lang="en-US" smtClean="0"/>
-              <a:t>4/2/2024</a:t>
+              <a:t>4/5/2024</a:t>
             </a:fld>
             <a:endParaRPr lang="en-US" dirty="0"/>
           </a:p>
@@ -864,7 +865,7 @@
           <a:p>
             <a:fld id="{BA901681-57B6-4587-B25D-B43F61E622D1}" type="datetimeFigureOut">
               <a:rPr lang="en-US" smtClean="0"/>
-              <a:t>4/2/2024</a:t>
+              <a:t>4/5/2024</a:t>
             </a:fld>
             <a:endParaRPr lang="en-US" dirty="0"/>
           </a:p>
@@ -1139,7 +1140,7 @@
           <a:p>
             <a:fld id="{BA901681-57B6-4587-B25D-B43F61E622D1}" type="datetimeFigureOut">
               <a:rPr lang="en-US" smtClean="0"/>
-              <a:t>4/2/2024</a:t>
+              <a:t>4/5/2024</a:t>
             </a:fld>
             <a:endParaRPr lang="en-US" dirty="0"/>
           </a:p>
@@ -1404,7 +1405,7 @@
           <a:p>
             <a:fld id="{BA901681-57B6-4587-B25D-B43F61E622D1}" type="datetimeFigureOut">
               <a:rPr lang="en-US" smtClean="0"/>
-              <a:t>4/2/2024</a:t>
+              <a:t>4/5/2024</a:t>
             </a:fld>
             <a:endParaRPr lang="en-US" dirty="0"/>
           </a:p>
@@ -1816,7 +1817,7 @@
           <a:p>
             <a:fld id="{BA901681-57B6-4587-B25D-B43F61E622D1}" type="datetimeFigureOut">
               <a:rPr lang="en-US" smtClean="0"/>
-              <a:t>4/2/2024</a:t>
+              <a:t>4/5/2024</a:t>
             </a:fld>
             <a:endParaRPr lang="en-US" dirty="0"/>
           </a:p>
@@ -1957,7 +1958,7 @@
           <a:p>
             <a:fld id="{BA901681-57B6-4587-B25D-B43F61E622D1}" type="datetimeFigureOut">
               <a:rPr lang="en-US" smtClean="0"/>
-              <a:t>4/2/2024</a:t>
+              <a:t>4/5/2024</a:t>
             </a:fld>
             <a:endParaRPr lang="en-US" dirty="0"/>
           </a:p>
@@ -2070,7 +2071,7 @@
           <a:p>
             <a:fld id="{BA901681-57B6-4587-B25D-B43F61E622D1}" type="datetimeFigureOut">
               <a:rPr lang="en-US" smtClean="0"/>
-              <a:t>4/2/2024</a:t>
+              <a:t>4/5/2024</a:t>
             </a:fld>
             <a:endParaRPr lang="en-US" dirty="0"/>
           </a:p>
@@ -2381,7 +2382,7 @@
           <a:p>
             <a:fld id="{BA901681-57B6-4587-B25D-B43F61E622D1}" type="datetimeFigureOut">
               <a:rPr lang="en-US" smtClean="0"/>
-              <a:t>4/2/2024</a:t>
+              <a:t>4/5/2024</a:t>
             </a:fld>
             <a:endParaRPr lang="en-US" dirty="0"/>
           </a:p>
@@ -2669,7 +2670,7 @@
           <a:p>
             <a:fld id="{BA901681-57B6-4587-B25D-B43F61E622D1}" type="datetimeFigureOut">
               <a:rPr lang="en-US" smtClean="0"/>
-              <a:t>4/2/2024</a:t>
+              <a:t>4/5/2024</a:t>
             </a:fld>
             <a:endParaRPr lang="en-US" dirty="0"/>
           </a:p>
@@ -2910,7 +2911,7 @@
           <a:p>
             <a:fld id="{BA901681-57B6-4587-B25D-B43F61E622D1}" type="datetimeFigureOut">
               <a:rPr lang="en-US" smtClean="0"/>
-              <a:t>4/2/2024</a:t>
+              <a:t>4/5/2024</a:t>
             </a:fld>
             <a:endParaRPr lang="en-US" dirty="0"/>
           </a:p>
@@ -4897,6 +4898,359 @@
 </p:sld>
 </file>
 
+<file path=ppt/slides/slide3.xml><?xml version="1.0" encoding="utf-8"?>
+<p:sld xmlns:a="http://schemas.openxmlformats.org/drawingml/2006/main" xmlns:r="http://schemas.openxmlformats.org/officeDocument/2006/relationships" xmlns:p="http://schemas.openxmlformats.org/presentationml/2006/main">
+  <p:cSld>
+    <p:bg>
+      <p:bgPr>
+        <a:gradFill flip="none" rotWithShape="1">
+          <a:gsLst>
+            <a:gs pos="0">
+              <a:schemeClr val="accent1">
+                <a:lumMod val="89000"/>
+              </a:schemeClr>
+            </a:gs>
+            <a:gs pos="23000">
+              <a:schemeClr val="accent1">
+                <a:lumMod val="89000"/>
+              </a:schemeClr>
+            </a:gs>
+            <a:gs pos="69000">
+              <a:schemeClr val="accent1">
+                <a:lumMod val="75000"/>
+              </a:schemeClr>
+            </a:gs>
+            <a:gs pos="97000">
+              <a:schemeClr val="accent1">
+                <a:lumMod val="70000"/>
+              </a:schemeClr>
+            </a:gs>
+          </a:gsLst>
+          <a:path path="circle">
+            <a:fillToRect l="50000" t="50000" r="50000" b="50000"/>
+          </a:path>
+          <a:tileRect/>
+        </a:gradFill>
+        <a:effectLst/>
+      </p:bgPr>
+    </p:bg>
+    <p:spTree>
+      <p:nvGrpSpPr>
+        <p:cNvPr id="1" name=""/>
+        <p:cNvGrpSpPr/>
+        <p:nvPr/>
+      </p:nvGrpSpPr>
+      <p:grpSpPr>
+        <a:xfrm>
+          <a:off x="0" y="0"/>
+          <a:ext cx="0" cy="0"/>
+          <a:chOff x="0" y="0"/>
+          <a:chExt cx="0" cy="0"/>
+        </a:xfrm>
+      </p:grpSpPr>
+      <p:sp>
+        <p:nvSpPr>
+          <p:cNvPr id="2" name="TextBox 1">
+            <a:extLst>
+              <a:ext uri="{FF2B5EF4-FFF2-40B4-BE49-F238E27FC236}">
+                <a16:creationId xmlns:a16="http://schemas.microsoft.com/office/drawing/2014/main" id="{5CD52C68-0A14-2C50-9B90-DCB9DA0BE0A2}"/>
+              </a:ext>
+            </a:extLst>
+          </p:cNvPr>
+          <p:cNvSpPr txBox="1"/>
+          <p:nvPr/>
+        </p:nvSpPr>
+        <p:spPr>
+          <a:xfrm>
+            <a:off x="4505738" y="0"/>
+            <a:ext cx="7911547" cy="4179816"/>
+          </a:xfrm>
+          <a:prstGeom prst="rect">
+            <a:avLst/>
+          </a:prstGeom>
+        </p:spPr>
+        <p:txBody>
+          <a:bodyPr vert="horz" lIns="91440" tIns="45720" rIns="91440" bIns="45720" rtlCol="0" anchor="b">
+            <a:noAutofit/>
+          </a:bodyPr>
+          <a:lstStyle/>
+          <a:p>
+            <a:pPr marL="0" marR="0" lvl="0" indent="0" algn="r" defTabSz="914400" rtl="0" eaLnBrk="1" fontAlgn="auto" latinLnBrk="0" hangingPunct="1">
+              <a:lnSpc>
+                <a:spcPct val="90000"/>
+              </a:lnSpc>
+              <a:spcBef>
+                <a:spcPct val="0"/>
+              </a:spcBef>
+              <a:spcAft>
+                <a:spcPts val="600"/>
+              </a:spcAft>
+              <a:buClrTx/>
+              <a:buSzTx/>
+              <a:buFontTx/>
+              <a:buNone/>
+              <a:tabLst/>
+              <a:defRPr/>
+            </a:pPr>
+            <a:endParaRPr kumimoji="0" lang="en-US" sz="4200" i="0" u="none" strike="noStrike" kern="1200" cap="none" spc="0" normalizeH="0" baseline="0" noProof="0" dirty="0">
+              <a:ln>
+                <a:noFill/>
+              </a:ln>
+              <a:solidFill>
+                <a:prstClr val="white"/>
+              </a:solidFill>
+              <a:effectLst/>
+              <a:uLnTx/>
+              <a:uFillTx/>
+              <a:latin typeface="Century Gothic" panose="020B0502020202020204" pitchFamily="34" charset="0"/>
+              <a:ea typeface="+mn-ea"/>
+              <a:cs typeface="+mn-cs"/>
+            </a:endParaRPr>
+          </a:p>
+          <a:p>
+            <a:pPr marL="0" marR="0" lvl="0" indent="0" defTabSz="914400" rtl="0" eaLnBrk="1" fontAlgn="auto" latinLnBrk="0" hangingPunct="1">
+              <a:lnSpc>
+                <a:spcPct val="90000"/>
+              </a:lnSpc>
+              <a:spcBef>
+                <a:spcPct val="0"/>
+              </a:spcBef>
+              <a:spcAft>
+                <a:spcPts val="600"/>
+              </a:spcAft>
+              <a:buClrTx/>
+              <a:buSzTx/>
+              <a:buFontTx/>
+              <a:buNone/>
+              <a:tabLst/>
+              <a:defRPr/>
+            </a:pPr>
+            <a:r>
+              <a:rPr kumimoji="0" lang="en-US" sz="4200" i="0" u="none" strike="noStrike" kern="1200" cap="none" spc="0" normalizeH="0" baseline="0" noProof="0" dirty="0">
+                <a:ln>
+                  <a:noFill/>
+                </a:ln>
+                <a:solidFill>
+                  <a:prstClr val="white"/>
+                </a:solidFill>
+                <a:effectLst/>
+                <a:uLnTx/>
+                <a:uFillTx/>
+                <a:latin typeface="Century Gothic" panose="020B0502020202020204" pitchFamily="34" charset="0"/>
+                <a:ea typeface="+mn-ea"/>
+                <a:cs typeface="+mn-cs"/>
+              </a:rPr>
+              <a:t>Enhance Generative AI</a:t>
+            </a:r>
+          </a:p>
+          <a:p>
+            <a:pPr marL="0" marR="0" lvl="0" indent="0" defTabSz="914400" rtl="0" eaLnBrk="1" fontAlgn="auto" latinLnBrk="0" hangingPunct="1">
+              <a:lnSpc>
+                <a:spcPct val="90000"/>
+              </a:lnSpc>
+              <a:spcBef>
+                <a:spcPct val="0"/>
+              </a:spcBef>
+              <a:spcAft>
+                <a:spcPts val="600"/>
+              </a:spcAft>
+              <a:buClrTx/>
+              <a:buSzTx/>
+              <a:buFontTx/>
+              <a:buNone/>
+              <a:tabLst/>
+              <a:defRPr/>
+            </a:pPr>
+            <a:r>
+              <a:rPr kumimoji="0" lang="en-US" sz="4200" b="1" i="0" u="none" strike="noStrike" kern="1200" cap="none" spc="0" normalizeH="0" baseline="0" noProof="0" dirty="0">
+                <a:ln>
+                  <a:noFill/>
+                </a:ln>
+                <a:solidFill>
+                  <a:srgbClr val="FFC000"/>
+                </a:solidFill>
+                <a:effectLst/>
+                <a:uLnTx/>
+                <a:uFillTx/>
+                <a:latin typeface="Century Gothic" panose="020B0502020202020204" pitchFamily="34" charset="0"/>
+                <a:ea typeface="+mn-ea"/>
+                <a:cs typeface="+mn-cs"/>
+              </a:rPr>
+              <a:t>Performance</a:t>
+            </a:r>
+            <a:r>
+              <a:rPr kumimoji="0" lang="en-US" sz="4200" i="0" u="none" strike="noStrike" kern="1200" cap="none" spc="0" normalizeH="0" baseline="0" noProof="0" dirty="0">
+                <a:ln>
+                  <a:noFill/>
+                </a:ln>
+                <a:solidFill>
+                  <a:prstClr val="white"/>
+                </a:solidFill>
+                <a:effectLst/>
+                <a:uLnTx/>
+                <a:uFillTx/>
+                <a:latin typeface="Century Gothic" panose="020B0502020202020204" pitchFamily="34" charset="0"/>
+                <a:ea typeface="+mn-ea"/>
+                <a:cs typeface="+mn-cs"/>
+              </a:rPr>
+              <a:t> with</a:t>
+            </a:r>
+          </a:p>
+          <a:p>
+            <a:pPr marL="0" marR="0" lvl="0" indent="0" defTabSz="914400" rtl="0" eaLnBrk="1" fontAlgn="auto" latinLnBrk="0" hangingPunct="1">
+              <a:lnSpc>
+                <a:spcPct val="90000"/>
+              </a:lnSpc>
+              <a:spcBef>
+                <a:spcPct val="0"/>
+              </a:spcBef>
+              <a:spcAft>
+                <a:spcPts val="600"/>
+              </a:spcAft>
+              <a:buClrTx/>
+              <a:buSzTx/>
+              <a:buFontTx/>
+              <a:buNone/>
+              <a:tabLst/>
+              <a:defRPr/>
+            </a:pPr>
+            <a:r>
+              <a:rPr lang="en-US" sz="4200" dirty="0">
+                <a:solidFill>
+                  <a:prstClr val="white"/>
+                </a:solidFill>
+                <a:latin typeface="Century Gothic" panose="020B0502020202020204" pitchFamily="34" charset="0"/>
+              </a:rPr>
+              <a:t>Calculated </a:t>
+            </a:r>
+            <a:r>
+              <a:rPr lang="en-US" sz="4200" b="1" dirty="0">
+                <a:solidFill>
+                  <a:srgbClr val="FFC000"/>
+                </a:solidFill>
+                <a:latin typeface="Century Gothic" panose="020B0502020202020204" pitchFamily="34" charset="0"/>
+              </a:rPr>
+              <a:t>Probabilities</a:t>
+            </a:r>
+            <a:r>
+              <a:rPr lang="en-US" sz="4200" b="1" dirty="0">
+                <a:solidFill>
+                  <a:prstClr val="white"/>
+                </a:solidFill>
+                <a:latin typeface="Century Gothic" panose="020B0502020202020204" pitchFamily="34" charset="0"/>
+              </a:rPr>
+              <a:t> </a:t>
+            </a:r>
+            <a:r>
+              <a:rPr kumimoji="0" lang="en-US" sz="4200" i="0" u="none" strike="noStrike" kern="1200" cap="none" spc="0" normalizeH="0" baseline="0" noProof="0" dirty="0">
+                <a:ln>
+                  <a:noFill/>
+                </a:ln>
+                <a:solidFill>
+                  <a:prstClr val="white"/>
+                </a:solidFill>
+                <a:effectLst/>
+                <a:uLnTx/>
+                <a:uFillTx/>
+                <a:latin typeface="Century Gothic" panose="020B0502020202020204" pitchFamily="34" charset="0"/>
+                <a:ea typeface="+mn-ea"/>
+                <a:cs typeface="+mn-cs"/>
+              </a:rPr>
+              <a:t>from</a:t>
+            </a:r>
+          </a:p>
+          <a:p>
+            <a:pPr marL="0" marR="0" lvl="0" indent="0" defTabSz="914400" rtl="0" eaLnBrk="1" fontAlgn="auto" latinLnBrk="0" hangingPunct="1">
+              <a:lnSpc>
+                <a:spcPct val="90000"/>
+              </a:lnSpc>
+              <a:spcBef>
+                <a:spcPct val="0"/>
+              </a:spcBef>
+              <a:spcAft>
+                <a:spcPts val="600"/>
+              </a:spcAft>
+              <a:buClrTx/>
+              <a:buSzTx/>
+              <a:buFontTx/>
+              <a:buNone/>
+              <a:tabLst/>
+              <a:defRPr/>
+            </a:pPr>
+            <a:r>
+              <a:rPr kumimoji="0" lang="en-US" sz="4200" b="1" i="0" u="none" strike="noStrike" kern="1200" cap="none" spc="0" normalizeH="0" baseline="0" noProof="0" dirty="0">
+                <a:ln>
+                  <a:noFill/>
+                </a:ln>
+                <a:solidFill>
+                  <a:srgbClr val="FFC000"/>
+                </a:solidFill>
+                <a:effectLst/>
+                <a:uLnTx/>
+                <a:uFillTx/>
+                <a:latin typeface="Century Gothic" panose="020B0502020202020204" pitchFamily="34" charset="0"/>
+                <a:ea typeface="+mn-ea"/>
+                <a:cs typeface="+mn-cs"/>
+              </a:rPr>
+              <a:t>Azure OpenAI LogProbs</a:t>
+            </a:r>
+          </a:p>
+        </p:txBody>
+      </p:sp>
+      <p:pic>
+        <p:nvPicPr>
+          <p:cNvPr id="9" name="Picture 8">
+            <a:extLst>
+              <a:ext uri="{FF2B5EF4-FFF2-40B4-BE49-F238E27FC236}">
+                <a16:creationId xmlns:a16="http://schemas.microsoft.com/office/drawing/2014/main" id="{17CF05A4-B6DC-F1BA-8A31-F7D03D747B01}"/>
+              </a:ext>
+            </a:extLst>
+          </p:cNvPr>
+          <p:cNvPicPr>
+            <a:picLocks noChangeAspect="1"/>
+          </p:cNvPicPr>
+          <p:nvPr/>
+        </p:nvPicPr>
+        <p:blipFill>
+          <a:blip r:embed="rId2">
+            <a:extLst>
+              <a:ext uri="{28A0092B-C50C-407E-A947-70E740481C1C}">
+                <a14:useLocalDpi xmlns:a14="http://schemas.microsoft.com/office/drawing/2010/main" val="0"/>
+              </a:ext>
+            </a:extLst>
+          </a:blip>
+          <a:stretch>
+            <a:fillRect/>
+          </a:stretch>
+        </p:blipFill>
+        <p:spPr>
+          <a:xfrm>
+            <a:off x="126640" y="568339"/>
+            <a:ext cx="4379098" cy="4794374"/>
+          </a:xfrm>
+          <a:prstGeom prst="roundRect">
+            <a:avLst/>
+          </a:prstGeom>
+          <a:ln w="57150">
+            <a:solidFill>
+              <a:schemeClr val="bg1"/>
+            </a:solidFill>
+          </a:ln>
+        </p:spPr>
+      </p:pic>
+    </p:spTree>
+    <p:extLst>
+      <p:ext uri="{BB962C8B-B14F-4D97-AF65-F5344CB8AC3E}">
+        <p14:creationId xmlns:p14="http://schemas.microsoft.com/office/powerpoint/2010/main" val="3075170746"/>
+      </p:ext>
+    </p:extLst>
+  </p:cSld>
+  <p:clrMapOvr>
+    <a:masterClrMapping/>
+  </p:clrMapOvr>
+</p:sld>
+</file>
+
 <file path=ppt/theme/theme1.xml><?xml version="1.0" encoding="utf-8"?>
 <a:theme xmlns:a="http://schemas.openxmlformats.org/drawingml/2006/main" name="Office Theme">
   <a:themeElements>

</xml_diff>

<commit_message>
Updated the title picture
</commit_message>
<xml_diff>
--- a/AzureOpenAILogProbs/Images/AzureOpenAILogProbs.pptx
+++ b/AzureOpenAILogProbs/Images/AzureOpenAILogProbs.pptx
@@ -261,7 +261,7 @@
           <a:p>
             <a:fld id="{BA901681-57B6-4587-B25D-B43F61E622D1}" type="datetimeFigureOut">
               <a:rPr lang="en-US" smtClean="0"/>
-              <a:t>4/5/2024</a:t>
+              <a:t>4/9/2024</a:t>
             </a:fld>
             <a:endParaRPr lang="en-US" dirty="0"/>
           </a:p>
@@ -459,7 +459,7 @@
           <a:p>
             <a:fld id="{BA901681-57B6-4587-B25D-B43F61E622D1}" type="datetimeFigureOut">
               <a:rPr lang="en-US" smtClean="0"/>
-              <a:t>4/5/2024</a:t>
+              <a:t>4/9/2024</a:t>
             </a:fld>
             <a:endParaRPr lang="en-US" dirty="0"/>
           </a:p>
@@ -667,7 +667,7 @@
           <a:p>
             <a:fld id="{BA901681-57B6-4587-B25D-B43F61E622D1}" type="datetimeFigureOut">
               <a:rPr lang="en-US" smtClean="0"/>
-              <a:t>4/5/2024</a:t>
+              <a:t>4/9/2024</a:t>
             </a:fld>
             <a:endParaRPr lang="en-US" dirty="0"/>
           </a:p>
@@ -865,7 +865,7 @@
           <a:p>
             <a:fld id="{BA901681-57B6-4587-B25D-B43F61E622D1}" type="datetimeFigureOut">
               <a:rPr lang="en-US" smtClean="0"/>
-              <a:t>4/5/2024</a:t>
+              <a:t>4/9/2024</a:t>
             </a:fld>
             <a:endParaRPr lang="en-US" dirty="0"/>
           </a:p>
@@ -1140,7 +1140,7 @@
           <a:p>
             <a:fld id="{BA901681-57B6-4587-B25D-B43F61E622D1}" type="datetimeFigureOut">
               <a:rPr lang="en-US" smtClean="0"/>
-              <a:t>4/5/2024</a:t>
+              <a:t>4/9/2024</a:t>
             </a:fld>
             <a:endParaRPr lang="en-US" dirty="0"/>
           </a:p>
@@ -1405,7 +1405,7 @@
           <a:p>
             <a:fld id="{BA901681-57B6-4587-B25D-B43F61E622D1}" type="datetimeFigureOut">
               <a:rPr lang="en-US" smtClean="0"/>
-              <a:t>4/5/2024</a:t>
+              <a:t>4/9/2024</a:t>
             </a:fld>
             <a:endParaRPr lang="en-US" dirty="0"/>
           </a:p>
@@ -1817,7 +1817,7 @@
           <a:p>
             <a:fld id="{BA901681-57B6-4587-B25D-B43F61E622D1}" type="datetimeFigureOut">
               <a:rPr lang="en-US" smtClean="0"/>
-              <a:t>4/5/2024</a:t>
+              <a:t>4/9/2024</a:t>
             </a:fld>
             <a:endParaRPr lang="en-US" dirty="0"/>
           </a:p>
@@ -1958,7 +1958,7 @@
           <a:p>
             <a:fld id="{BA901681-57B6-4587-B25D-B43F61E622D1}" type="datetimeFigureOut">
               <a:rPr lang="en-US" smtClean="0"/>
-              <a:t>4/5/2024</a:t>
+              <a:t>4/9/2024</a:t>
             </a:fld>
             <a:endParaRPr lang="en-US" dirty="0"/>
           </a:p>
@@ -2071,7 +2071,7 @@
           <a:p>
             <a:fld id="{BA901681-57B6-4587-B25D-B43F61E622D1}" type="datetimeFigureOut">
               <a:rPr lang="en-US" smtClean="0"/>
-              <a:t>4/5/2024</a:t>
+              <a:t>4/9/2024</a:t>
             </a:fld>
             <a:endParaRPr lang="en-US" dirty="0"/>
           </a:p>
@@ -2382,7 +2382,7 @@
           <a:p>
             <a:fld id="{BA901681-57B6-4587-B25D-B43F61E622D1}" type="datetimeFigureOut">
               <a:rPr lang="en-US" smtClean="0"/>
-              <a:t>4/5/2024</a:t>
+              <a:t>4/9/2024</a:t>
             </a:fld>
             <a:endParaRPr lang="en-US" dirty="0"/>
           </a:p>
@@ -2670,7 +2670,7 @@
           <a:p>
             <a:fld id="{BA901681-57B6-4587-B25D-B43F61E622D1}" type="datetimeFigureOut">
               <a:rPr lang="en-US" smtClean="0"/>
-              <a:t>4/5/2024</a:t>
+              <a:t>4/9/2024</a:t>
             </a:fld>
             <a:endParaRPr lang="en-US" dirty="0"/>
           </a:p>
@@ -2911,7 +2911,7 @@
           <a:p>
             <a:fld id="{BA901681-57B6-4587-B25D-B43F61E622D1}" type="datetimeFigureOut">
               <a:rPr lang="en-US" smtClean="0"/>
-              <a:t>4/5/2024</a:t>
+              <a:t>4/9/2024</a:t>
             </a:fld>
             <a:endParaRPr lang="en-US" dirty="0"/>
           </a:p>
@@ -4962,7 +4962,7 @@
         </p:nvSpPr>
         <p:spPr>
           <a:xfrm>
-            <a:off x="4505738" y="0"/>
+            <a:off x="5268461" y="251352"/>
             <a:ext cx="7911547" cy="4179816"/>
           </a:xfrm>
           <a:prstGeom prst="rect">
@@ -5093,70 +5093,7 @@
                 <a:ea typeface="+mn-ea"/>
                 <a:cs typeface="+mn-cs"/>
               </a:rPr>
-              <a:t> with</a:t>
-            </a:r>
-          </a:p>
-          <a:p>
-            <a:pPr marL="0" marR="0" lvl="0" indent="0" defTabSz="914400" rtl="0" eaLnBrk="1" fontAlgn="auto" latinLnBrk="0" hangingPunct="1">
-              <a:lnSpc>
-                <a:spcPct val="90000"/>
-              </a:lnSpc>
-              <a:spcBef>
-                <a:spcPct val="0"/>
-              </a:spcBef>
-              <a:spcAft>
-                <a:spcPts val="600"/>
-              </a:spcAft>
-              <a:buClrTx/>
-              <a:buSzTx/>
-              <a:buFontTx/>
-              <a:buNone/>
-              <a:tabLst/>
-              <a:defRPr/>
-            </a:pPr>
-            <a:r>
-              <a:rPr lang="en-US" sz="4200" dirty="0">
-                <a:solidFill>
-                  <a:prstClr val="white"/>
-                </a:solidFill>
-                <a:latin typeface="Century Gothic" panose="020B0502020202020204" pitchFamily="34" charset="0"/>
-              </a:rPr>
-              <a:t>Calculated </a:t>
-            </a:r>
-            <a:r>
-              <a:rPr lang="en-US" sz="4200" b="1" dirty="0">
-                <a:solidFill>
-                  <a:srgbClr val="FFC000"/>
-                </a:solidFill>
-                <a:latin typeface="Century Gothic" panose="020B0502020202020204" pitchFamily="34" charset="0"/>
-              </a:rPr>
-              <a:t>Probabilities</a:t>
-            </a:r>
-            <a:r>
-              <a:rPr lang="en-US" sz="4200" b="1" dirty="0">
-                <a:solidFill>
-                  <a:prstClr val="white"/>
-                </a:solidFill>
-                <a:latin typeface="Century Gothic" panose="020B0502020202020204" pitchFamily="34" charset="0"/>
-              </a:rPr>
-              <a:t> </a:t>
-            </a:r>
-            <a:r>
-              <a:rPr kumimoji="0" lang="en-US" sz="4200" i="0" u="none" strike="noStrike" kern="1200" cap="none" spc="0" normalizeH="0" baseline="0" noProof="0" dirty="0">
-                <a:ln>
-                  <a:noFill/>
-                </a:ln>
-                <a:solidFill>
-                  <a:prstClr val="white"/>
-                </a:solidFill>
-                <a:effectLst/>
-                <a:uLnTx/>
-                <a:uFillTx/>
-                <a:latin typeface="Century Gothic" panose="020B0502020202020204" pitchFamily="34" charset="0"/>
-                <a:ea typeface="+mn-ea"/>
-                <a:cs typeface="+mn-cs"/>
-              </a:rPr>
-              <a:t>from</a:t>
+              <a:t> using</a:t>
             </a:r>
           </a:p>
           <a:p>
@@ -5192,7 +5129,7 @@
                 <a:ea typeface="+mn-ea"/>
                 <a:cs typeface="+mn-cs"/>
               </a:rPr>
-              <a:t>Azure OpenAI LogProbs</a:t>
+              <a:t>Azure OpenAI LogProbs Probabilities</a:t>
             </a:r>
           </a:p>
         </p:txBody>
@@ -5225,8 +5162,8 @@
         </p:blipFill>
         <p:spPr>
           <a:xfrm>
-            <a:off x="126640" y="568339"/>
-            <a:ext cx="4379098" cy="4794374"/>
+            <a:off x="291318" y="585673"/>
+            <a:ext cx="4753049" cy="5203787"/>
           </a:xfrm>
           <a:prstGeom prst="roundRect">
             <a:avLst/>

</xml_diff>